<commit_message>
game first step created
</commit_message>
<xml_diff>
--- a/java institute notes/java_note.pptx
+++ b/java institute notes/java_note.pptx
@@ -10,6 +10,7 @@
     <p:sldId id="258" r:id="rId4"/>
     <p:sldId id="257" r:id="rId5"/>
     <p:sldId id="256" r:id="rId6"/>
+    <p:sldId id="261" r:id="rId7"/>
   </p:sldIdLst>
   <p:sldSz cx="12192000" cy="6858000"/>
   <p:notesSz cx="6858000" cy="9144000"/>
@@ -108,6 +109,11 @@
       </a:defRPr>
     </a:lvl9pPr>
   </p:defaultTextStyle>
+  <p:extLst>
+    <p:ext uri="{EFAFB233-063F-42B5-8137-9DF3F51BA10A}">
+      <p15:sldGuideLst xmlns:p15="http://schemas.microsoft.com/office/powerpoint/2012/main"/>
+    </p:ext>
+  </p:extLst>
 </p:presentation>
 </file>
 
@@ -3418,7 +3424,6 @@
               <a:rPr lang="en-GB" smtClean="0"/>
               <a:t>* s(yakada kali valata pana </a:t>
             </a:r>
-            <a:endParaRPr lang="en-GB" smtClean="0"/>
           </a:p>
           <a:p>
             <a:r>
@@ -3796,7 +3801,7 @@
         </p:nvSpPr>
         <p:spPr bwMode="auto">
           <a:xfrm>
-            <a:off x="2771554" y="673910"/>
+            <a:off x="2665801" y="630437"/>
             <a:ext cx="1546129" cy="815608"/>
           </a:xfrm>
           <a:prstGeom prst="rect">
@@ -3956,7 +3961,7 @@
         </p:nvSpPr>
         <p:spPr bwMode="auto">
           <a:xfrm>
-            <a:off x="2805221" y="798841"/>
+            <a:off x="2699468" y="755368"/>
             <a:ext cx="909223" cy="1200329"/>
           </a:xfrm>
           <a:prstGeom prst="rect">
@@ -4139,7 +4144,7 @@
         </p:nvSpPr>
         <p:spPr bwMode="auto">
           <a:xfrm>
-            <a:off x="2537195" y="1515819"/>
+            <a:off x="2431442" y="1472346"/>
             <a:ext cx="3829959" cy="815608"/>
           </a:xfrm>
           <a:prstGeom prst="rect">
@@ -4329,7 +4334,7 @@
         </p:nvSpPr>
         <p:spPr bwMode="auto">
           <a:xfrm>
-            <a:off x="2716823" y="1829526"/>
+            <a:off x="2611070" y="1786053"/>
             <a:ext cx="3736857" cy="815608"/>
           </a:xfrm>
           <a:prstGeom prst="rect">
@@ -5867,7 +5872,7 @@
         </p:nvCxnSpPr>
         <p:spPr>
           <a:xfrm>
-            <a:off x="5889356" y="1082298"/>
+            <a:off x="5783603" y="1038825"/>
             <a:ext cx="294468" cy="576021"/>
           </a:xfrm>
           <a:prstGeom prst="line">
@@ -5897,7 +5902,7 @@
         </p:nvSpPr>
         <p:spPr>
           <a:xfrm>
-            <a:off x="2112631" y="1973019"/>
+            <a:off x="2006878" y="1929546"/>
             <a:ext cx="648391" cy="369332"/>
           </a:xfrm>
           <a:prstGeom prst="rect">
@@ -5927,7 +5932,7 @@
         </p:nvCxnSpPr>
         <p:spPr>
           <a:xfrm>
-            <a:off x="2456547" y="2165539"/>
+            <a:off x="2350794" y="2122066"/>
             <a:ext cx="630014" cy="25866"/>
           </a:xfrm>
           <a:prstGeom prst="line">
@@ -5957,7 +5962,7 @@
         </p:nvSpPr>
         <p:spPr>
           <a:xfrm>
-            <a:off x="5778173" y="826718"/>
+            <a:off x="5672420" y="783245"/>
             <a:ext cx="648391" cy="369332"/>
           </a:xfrm>
           <a:prstGeom prst="rect">
@@ -5987,7 +5992,7 @@
         </p:nvCxnSpPr>
         <p:spPr>
           <a:xfrm flipV="1">
-            <a:off x="1911062" y="2531915"/>
+            <a:off x="1805309" y="2488442"/>
             <a:ext cx="1115353" cy="5911"/>
           </a:xfrm>
           <a:prstGeom prst="line">
@@ -6017,7 +6022,7 @@
         </p:nvSpPr>
         <p:spPr>
           <a:xfrm>
-            <a:off x="1586275" y="2342351"/>
+            <a:off x="1480522" y="2298878"/>
             <a:ext cx="648391" cy="369332"/>
           </a:xfrm>
           <a:prstGeom prst="rect">
@@ -6047,7 +6052,7 @@
         </p:nvCxnSpPr>
         <p:spPr>
           <a:xfrm flipV="1">
-            <a:off x="1639075" y="2762485"/>
+            <a:off x="1533322" y="2719012"/>
             <a:ext cx="1115353" cy="5911"/>
           </a:xfrm>
           <a:prstGeom prst="line">
@@ -6077,7 +6082,7 @@
         </p:nvSpPr>
         <p:spPr>
           <a:xfrm>
-            <a:off x="1314288" y="2572921"/>
+            <a:off x="1208535" y="2529448"/>
             <a:ext cx="648391" cy="369332"/>
           </a:xfrm>
           <a:prstGeom prst="rect">
@@ -6107,7 +6112,7 @@
         </p:nvCxnSpPr>
         <p:spPr>
           <a:xfrm flipV="1">
-            <a:off x="1533322" y="3022652"/>
+            <a:off x="1427569" y="2979179"/>
             <a:ext cx="1115353" cy="5911"/>
           </a:xfrm>
           <a:prstGeom prst="line">
@@ -6163,6 +6168,337 @@
     <p:extLst>
       <p:ext uri="{BB962C8B-B14F-4D97-AF65-F5344CB8AC3E}">
         <p14:creationId xmlns:p14="http://schemas.microsoft.com/office/powerpoint/2010/main" val="722606211"/>
+      </p:ext>
+    </p:extLst>
+  </p:cSld>
+  <p:clrMapOvr>
+    <a:masterClrMapping/>
+  </p:clrMapOvr>
+</p:sld>
+</file>
+
+<file path=ppt/slides/slide6.xml><?xml version="1.0" encoding="utf-8"?>
+<p:sld xmlns:a="http://schemas.openxmlformats.org/drawingml/2006/main" xmlns:r="http://schemas.openxmlformats.org/officeDocument/2006/relationships" xmlns:p="http://schemas.openxmlformats.org/presentationml/2006/main">
+  <p:cSld>
+    <p:spTree>
+      <p:nvGrpSpPr>
+        <p:cNvPr id="1" name=""/>
+        <p:cNvGrpSpPr/>
+        <p:nvPr/>
+      </p:nvGrpSpPr>
+      <p:grpSpPr>
+        <a:xfrm>
+          <a:off x="0" y="0"/>
+          <a:ext cx="0" cy="0"/>
+          <a:chOff x="0" y="0"/>
+          <a:chExt cx="0" cy="0"/>
+        </a:xfrm>
+      </p:grpSpPr>
+      <p:sp>
+        <p:nvSpPr>
+          <p:cNvPr id="2" name="TextBox 1"/>
+          <p:cNvSpPr txBox="1"/>
+          <p:nvPr/>
+        </p:nvSpPr>
+        <p:spPr>
+          <a:xfrm>
+            <a:off x="583890" y="636353"/>
+            <a:ext cx="11535530" cy="4524315"/>
+          </a:xfrm>
+          <a:prstGeom prst="rect">
+            <a:avLst/>
+          </a:prstGeom>
+          <a:noFill/>
+        </p:spPr>
+        <p:txBody>
+          <a:bodyPr wrap="none" rtlCol="0">
+            <a:spAutoFit/>
+          </a:bodyPr>
+          <a:lstStyle/>
+          <a:p>
+            <a:r>
+              <a:rPr lang="si-LK" smtClean="0"/>
+              <a:t>මෘදු ලෝකයේ මැශීන් එකක් සාදා ගන්නා ආකාරය</a:t>
+            </a:r>
+          </a:p>
+          <a:p>
+            <a:r>
+              <a:rPr lang="si-LK" smtClean="0"/>
+              <a:t>----------------------------------------------------------</a:t>
+            </a:r>
+          </a:p>
+          <a:p>
+            <a:r>
+              <a:rPr lang="si-LK" smtClean="0"/>
+              <a:t>1.අලියා ගෙන්න කලින් හෙන්ඩුව ගෙන්න ඕනෙ වගේ </a:t>
+            </a:r>
+            <a:r>
+              <a:rPr lang="en-US" smtClean="0"/>
+              <a:t>machine </a:t>
+            </a:r>
+            <a:r>
+              <a:rPr lang="si-LK" smtClean="0"/>
+              <a:t>හදන්න කලින් </a:t>
+            </a:r>
+            <a:r>
+              <a:rPr lang="en-US" smtClean="0"/>
+              <a:t>class </a:t>
+            </a:r>
+            <a:r>
+              <a:rPr lang="si-LK" smtClean="0"/>
+              <a:t>එකක් හදා ගන්න ඕනේ.</a:t>
+            </a:r>
+          </a:p>
+          <a:p>
+            <a:endParaRPr lang="en-US"/>
+          </a:p>
+          <a:p>
+            <a:r>
+              <a:rPr lang="en-US" smtClean="0"/>
+              <a:t>Class A{</a:t>
+            </a:r>
+          </a:p>
+          <a:p>
+            <a:endParaRPr lang="en-US"/>
+          </a:p>
+          <a:p>
+            <a:endParaRPr lang="en-US" smtClean="0"/>
+          </a:p>
+          <a:p>
+            <a:endParaRPr lang="en-US"/>
+          </a:p>
+          <a:p>
+            <a:endParaRPr lang="en-US" smtClean="0"/>
+          </a:p>
+          <a:p>
+            <a:endParaRPr lang="en-US"/>
+          </a:p>
+          <a:p>
+            <a:endParaRPr lang="en-US" smtClean="0"/>
+          </a:p>
+          <a:p>
+            <a:r>
+              <a:rPr lang="en-US" smtClean="0"/>
+              <a:t>}</a:t>
+            </a:r>
+            <a:endParaRPr lang="si-LK" smtClean="0"/>
+          </a:p>
+          <a:p>
+            <a:endParaRPr lang="si-LK"/>
+          </a:p>
+          <a:p>
+            <a:r>
+              <a:rPr lang="si-LK" smtClean="0"/>
+              <a:t>2.මිනිස්සු වේගෙන් යන්න කැමතියි.ඒකෙන් </a:t>
+            </a:r>
+            <a:r>
+              <a:rPr lang="en-US" smtClean="0"/>
+              <a:t>thrill </a:t>
+            </a:r>
+            <a:r>
+              <a:rPr lang="si-LK" smtClean="0"/>
+              <a:t>එකක් එනවා.ඒ ගැන ලියලා තියෙන්නේ අපේ </a:t>
+            </a:r>
+            <a:r>
+              <a:rPr lang="en-US" smtClean="0"/>
+              <a:t>DNA </a:t>
+            </a:r>
+            <a:r>
+              <a:rPr lang="si-LK" smtClean="0"/>
+              <a:t>වල.ඒක </a:t>
+            </a:r>
+            <a:r>
+              <a:rPr lang="en-US" smtClean="0"/>
+              <a:t>human ability </a:t>
+            </a:r>
+            <a:r>
+              <a:rPr lang="si-LK" smtClean="0"/>
+              <a:t>එකක්</a:t>
+            </a:r>
+          </a:p>
+          <a:p>
+            <a:r>
+              <a:rPr lang="si-LK" smtClean="0"/>
+              <a:t>3.</a:t>
+            </a:r>
+            <a:r>
+              <a:rPr lang="en-US" smtClean="0"/>
+              <a:t>Art of Visualizatio </a:t>
+            </a:r>
+            <a:r>
+              <a:rPr lang="si-LK" smtClean="0"/>
+              <a:t>කියන්නේ </a:t>
+            </a:r>
+            <a:r>
+              <a:rPr lang="en-US" smtClean="0"/>
+              <a:t>HUMAN ability </a:t>
+            </a:r>
+            <a:r>
+              <a:rPr lang="si-LK" smtClean="0"/>
+              <a:t>එකක් . ඒකට කියනවා </a:t>
+            </a:r>
+            <a:r>
+              <a:rPr lang="en-US" smtClean="0"/>
+              <a:t>thinking,perception </a:t>
+            </a:r>
+            <a:r>
+              <a:rPr lang="si-LK" smtClean="0"/>
+              <a:t>වගේ වචන.</a:t>
+            </a:r>
+          </a:p>
+          <a:p>
+            <a:endParaRPr lang="en-GB"/>
+          </a:p>
+        </p:txBody>
+      </p:sp>
+      <p:sp>
+        <p:nvSpPr>
+          <p:cNvPr id="3" name="Right Brace 2"/>
+          <p:cNvSpPr/>
+          <p:nvPr/>
+        </p:nvSpPr>
+        <p:spPr>
+          <a:xfrm>
+            <a:off x="3595607" y="2061275"/>
+            <a:ext cx="123986" cy="495945"/>
+          </a:xfrm>
+          <a:prstGeom prst="rightBrace">
+            <a:avLst/>
+          </a:prstGeom>
+        </p:spPr>
+        <p:style>
+          <a:lnRef idx="1">
+            <a:schemeClr val="accent1"/>
+          </a:lnRef>
+          <a:fillRef idx="0">
+            <a:schemeClr val="accent1"/>
+          </a:fillRef>
+          <a:effectRef idx="0">
+            <a:schemeClr val="accent1"/>
+          </a:effectRef>
+          <a:fontRef idx="minor">
+            <a:schemeClr val="tx1"/>
+          </a:fontRef>
+        </p:style>
+        <p:txBody>
+          <a:bodyPr rtlCol="0" anchor="ctr"/>
+          <a:lstStyle/>
+          <a:p>
+            <a:pPr algn="ctr"/>
+            <a:endParaRPr lang="en-GB"/>
+          </a:p>
+        </p:txBody>
+      </p:sp>
+      <p:sp>
+        <p:nvSpPr>
+          <p:cNvPr id="4" name="Left Brace 3"/>
+          <p:cNvSpPr/>
+          <p:nvPr/>
+        </p:nvSpPr>
+        <p:spPr>
+          <a:xfrm>
+            <a:off x="1813302" y="2944678"/>
+            <a:ext cx="123986" cy="588936"/>
+          </a:xfrm>
+          <a:prstGeom prst="leftBrace">
+            <a:avLst/>
+          </a:prstGeom>
+        </p:spPr>
+        <p:style>
+          <a:lnRef idx="1">
+            <a:schemeClr val="accent1"/>
+          </a:lnRef>
+          <a:fillRef idx="0">
+            <a:schemeClr val="accent1"/>
+          </a:fillRef>
+          <a:effectRef idx="0">
+            <a:schemeClr val="accent1"/>
+          </a:effectRef>
+          <a:fontRef idx="minor">
+            <a:schemeClr val="tx1"/>
+          </a:fontRef>
+        </p:style>
+        <p:txBody>
+          <a:bodyPr rtlCol="0" anchor="ctr"/>
+          <a:lstStyle/>
+          <a:p>
+            <a:pPr algn="ctr"/>
+            <a:endParaRPr lang="en-GB"/>
+          </a:p>
+        </p:txBody>
+      </p:sp>
+      <p:sp>
+        <p:nvSpPr>
+          <p:cNvPr id="5" name="Right Bracket 4"/>
+          <p:cNvSpPr/>
+          <p:nvPr/>
+        </p:nvSpPr>
+        <p:spPr>
+          <a:xfrm>
+            <a:off x="3828081" y="2557220"/>
+            <a:ext cx="495946" cy="790414"/>
+          </a:xfrm>
+          <a:prstGeom prst="rightBracket">
+            <a:avLst/>
+          </a:prstGeom>
+        </p:spPr>
+        <p:style>
+          <a:lnRef idx="1">
+            <a:schemeClr val="accent1"/>
+          </a:lnRef>
+          <a:fillRef idx="0">
+            <a:schemeClr val="accent1"/>
+          </a:fillRef>
+          <a:effectRef idx="0">
+            <a:schemeClr val="accent1"/>
+          </a:effectRef>
+          <a:fontRef idx="minor">
+            <a:schemeClr val="tx1"/>
+          </a:fontRef>
+        </p:style>
+        <p:txBody>
+          <a:bodyPr rtlCol="0" anchor="ctr"/>
+          <a:lstStyle/>
+          <a:p>
+            <a:pPr algn="ctr"/>
+            <a:endParaRPr lang="en-GB"/>
+          </a:p>
+        </p:txBody>
+      </p:sp>
+      <p:sp>
+        <p:nvSpPr>
+          <p:cNvPr id="6" name="TextBox 5"/>
+          <p:cNvSpPr txBox="1"/>
+          <p:nvPr/>
+        </p:nvSpPr>
+        <p:spPr>
+          <a:xfrm>
+            <a:off x="4572001" y="2760012"/>
+            <a:ext cx="1779654" cy="369332"/>
+          </a:xfrm>
+          <a:prstGeom prst="rect">
+            <a:avLst/>
+          </a:prstGeom>
+          <a:noFill/>
+        </p:spPr>
+        <p:txBody>
+          <a:bodyPr wrap="none" rtlCol="0">
+            <a:spAutoFit/>
+          </a:bodyPr>
+          <a:lstStyle/>
+          <a:p>
+            <a:r>
+              <a:rPr lang="si-LK" smtClean="0"/>
+              <a:t>ඉඩ වෙන් කරනවා</a:t>
+            </a:r>
+            <a:endParaRPr lang="en-GB"/>
+          </a:p>
+        </p:txBody>
+      </p:sp>
+    </p:spTree>
+    <p:extLst>
+      <p:ext uri="{BB962C8B-B14F-4D97-AF65-F5344CB8AC3E}">
+        <p14:creationId xmlns:p14="http://schemas.microsoft.com/office/powerpoint/2010/main" val="2209630593"/>
       </p:ext>
     </p:extLst>
   </p:cSld>

</xml_diff>